<commit_message>
updates made in preparation of presentation 2
</commit_message>
<xml_diff>
--- a/portfolio/PresentationElaboration.pptx
+++ b/portfolio/PresentationElaboration.pptx
@@ -5,7 +5,7 @@
     <p:sldMasterId id="2147483660" r:id="rId1"/>
   </p:sldMasterIdLst>
   <p:notesMasterIdLst>
-    <p:notesMasterId r:id="rId18"/>
+    <p:notesMasterId r:id="rId17"/>
   </p:notesMasterIdLst>
   <p:sldIdLst>
     <p:sldId id="256" r:id="rId2"/>
@@ -17,13 +17,12 @@
     <p:sldId id="287" r:id="rId8"/>
     <p:sldId id="288" r:id="rId9"/>
     <p:sldId id="289" r:id="rId10"/>
-    <p:sldId id="265" r:id="rId11"/>
-    <p:sldId id="290" r:id="rId12"/>
+    <p:sldId id="261" r:id="rId11"/>
+    <p:sldId id="265" r:id="rId12"/>
     <p:sldId id="271" r:id="rId13"/>
-    <p:sldId id="261" r:id="rId14"/>
-    <p:sldId id="267" r:id="rId15"/>
-    <p:sldId id="266" r:id="rId16"/>
-    <p:sldId id="282" r:id="rId17"/>
+    <p:sldId id="267" r:id="rId14"/>
+    <p:sldId id="266" r:id="rId15"/>
+    <p:sldId id="282" r:id="rId16"/>
   </p:sldIdLst>
   <p:sldSz cx="9144000" cy="6858000" type="letter"/>
   <p:notesSz cx="6858000" cy="9144000"/>
@@ -207,7 +206,7 @@
           <a:p>
             <a:fld id="{89A61C1C-259F-4962-A7D6-71E772769996}" type="datetimeFigureOut">
               <a:rPr lang="en-US" smtClean="0"/>
-              <a:t>2012-01-28</a:t>
+              <a:t>2012-03-12</a:t>
             </a:fld>
             <a:endParaRPr lang="en-US"/>
           </a:p>
@@ -521,17 +520,17 @@
           <a:p>
             <a:r>
               <a:rPr lang="en-US" dirty="0" smtClean="0"/>
-              <a:t>Do the Metrics Agent for the Formal Requirements Specification?</a:t>
-            </a:r>
-          </a:p>
-          <a:p>
-            <a:r>
-              <a:rPr lang="en-US" dirty="0" smtClean="0"/>
-              <a:t>I think my documentation</a:t>
+              <a:t>Am I trying to do too</a:t>
             </a:r>
             <a:r>
               <a:rPr lang="en-US" baseline="0" dirty="0" smtClean="0"/>
-              <a:t> was suggesting the safety officer agent.</a:t>
+              <a:t> much in my time frame?</a:t>
+            </a:r>
+          </a:p>
+          <a:p>
+            <a:r>
+              <a:rPr lang="en-US" baseline="0" dirty="0" smtClean="0"/>
+              <a:t>Quality concern by 100% test coverage of non-trivial code.  Won’t test API/library calls.  Will strive for low cyclomatic complexity.</a:t>
             </a:r>
             <a:endParaRPr lang="en-US" dirty="0"/>
           </a:p>
@@ -554,7 +553,7 @@
           <a:p>
             <a:fld id="{2711E407-3140-410D-B1AB-3643DD24E9EF}" type="slidenum">
               <a:rPr lang="en-US" smtClean="0"/>
-              <a:t>12</a:t>
+              <a:t>10</a:t>
             </a:fld>
             <a:endParaRPr lang="en-US"/>
           </a:p>
@@ -563,7 +562,7 @@
     </p:spTree>
     <p:extLst>
       <p:ext uri="{BB962C8B-B14F-4D97-AF65-F5344CB8AC3E}">
-        <p14:creationId xmlns:p14="http://schemas.microsoft.com/office/powerpoint/2010/main" val="3084319532"/>
+        <p14:creationId xmlns:p14="http://schemas.microsoft.com/office/powerpoint/2010/main" val="2271470169"/>
       </p:ext>
     </p:extLst>
   </p:cSld>
@@ -619,17 +618,17 @@
           <a:p>
             <a:r>
               <a:rPr lang="en-US" dirty="0" smtClean="0"/>
-              <a:t>Am I trying to do too</a:t>
+              <a:t>Do the Metrics Agent for the Formal Requirements Specification?</a:t>
+            </a:r>
+          </a:p>
+          <a:p>
+            <a:r>
+              <a:rPr lang="en-US" dirty="0" smtClean="0"/>
+              <a:t>I think my documentation</a:t>
             </a:r>
             <a:r>
               <a:rPr lang="en-US" baseline="0" dirty="0" smtClean="0"/>
-              <a:t> much in my time frame?</a:t>
-            </a:r>
-          </a:p>
-          <a:p>
-            <a:r>
-              <a:rPr lang="en-US" baseline="0" dirty="0" smtClean="0"/>
-              <a:t>Quality concern by 100% test coverage of non-trivial code.  Won’t test API/library calls.  Will strive for low cyclomatic complexity.</a:t>
+              <a:t> was suggesting the safety officer agent.</a:t>
             </a:r>
             <a:endParaRPr lang="en-US" dirty="0"/>
           </a:p>
@@ -652,7 +651,7 @@
           <a:p>
             <a:fld id="{2711E407-3140-410D-B1AB-3643DD24E9EF}" type="slidenum">
               <a:rPr lang="en-US" smtClean="0"/>
-              <a:t>13</a:t>
+              <a:t>12</a:t>
             </a:fld>
             <a:endParaRPr lang="en-US"/>
           </a:p>
@@ -661,7 +660,7 @@
     </p:spTree>
     <p:extLst>
       <p:ext uri="{BB962C8B-B14F-4D97-AF65-F5344CB8AC3E}">
-        <p14:creationId xmlns:p14="http://schemas.microsoft.com/office/powerpoint/2010/main" val="2271470169"/>
+        <p14:creationId xmlns:p14="http://schemas.microsoft.com/office/powerpoint/2010/main" val="3084319532"/>
       </p:ext>
     </p:extLst>
   </p:cSld>
@@ -4235,29 +4234,7 @@
                   </a:schemeClr>
                 </a:solidFill>
               </a:rPr>
-              <a:t>MSE Presentation </a:t>
-            </a:r>
-            <a:r>
-              <a:rPr lang="en-US" dirty="0" smtClean="0">
-                <a:solidFill>
-                  <a:schemeClr val="accent6">
-                    <a:lumMod val="60000"/>
-                    <a:lumOff val="40000"/>
-                  </a:schemeClr>
-                </a:solidFill>
-              </a:rPr>
-              <a:t>2</a:t>
-            </a:r>
-            <a:r>
-              <a:rPr lang="en-US" dirty="0" smtClean="0">
-                <a:solidFill>
-                  <a:schemeClr val="accent6">
-                    <a:lumMod val="60000"/>
-                    <a:lumOff val="40000"/>
-                  </a:schemeClr>
-                </a:solidFill>
-              </a:rPr>
-              <a:t/>
+              <a:t>MSE Presentation 2</a:t>
             </a:r>
             <a:br>
               <a:rPr lang="en-US" dirty="0" smtClean="0">
@@ -4353,6 +4330,250 @@
 </file>
 
 <file path=ppt/slides/slide10.xml><?xml version="1.0" encoding="utf-8"?>
+<p:sld xmlns:a="http://schemas.openxmlformats.org/drawingml/2006/main" xmlns:r="http://schemas.openxmlformats.org/officeDocument/2006/relationships" xmlns:p="http://schemas.openxmlformats.org/presentationml/2006/main">
+  <p:cSld>
+    <p:spTree>
+      <p:nvGrpSpPr>
+        <p:cNvPr id="1" name=""/>
+        <p:cNvGrpSpPr/>
+        <p:nvPr/>
+      </p:nvGrpSpPr>
+      <p:grpSpPr>
+        <a:xfrm>
+          <a:off x="0" y="0"/>
+          <a:ext cx="0" cy="0"/>
+          <a:chOff x="0" y="0"/>
+          <a:chExt cx="0" cy="0"/>
+        </a:xfrm>
+      </p:grpSpPr>
+      <p:sp>
+        <p:nvSpPr>
+          <p:cNvPr id="2" name="Title 1"/>
+          <p:cNvSpPr>
+            <a:spLocks noGrp="1"/>
+          </p:cNvSpPr>
+          <p:nvPr>
+            <p:ph type="title"/>
+          </p:nvPr>
+        </p:nvSpPr>
+        <p:spPr/>
+        <p:txBody>
+          <a:bodyPr/>
+          <a:lstStyle/>
+          <a:p>
+            <a:r>
+              <a:rPr lang="en-US" dirty="0" smtClean="0"/>
+              <a:t>Project Risks and Spikes</a:t>
+            </a:r>
+            <a:endParaRPr lang="en-US" dirty="0"/>
+          </a:p>
+        </p:txBody>
+      </p:sp>
+      <p:sp>
+        <p:nvSpPr>
+          <p:cNvPr id="6" name="Text Placeholder 5"/>
+          <p:cNvSpPr>
+            <a:spLocks noGrp="1"/>
+          </p:cNvSpPr>
+          <p:nvPr>
+            <p:ph type="body" idx="1"/>
+          </p:nvPr>
+        </p:nvSpPr>
+        <p:spPr>
+          <a:xfrm>
+            <a:off x="457200" y="1535113"/>
+            <a:ext cx="2743200" cy="639762"/>
+          </a:xfrm>
+        </p:spPr>
+        <p:txBody>
+          <a:bodyPr/>
+          <a:lstStyle/>
+          <a:p>
+            <a:r>
+              <a:rPr lang="en-US" dirty="0" smtClean="0"/>
+              <a:t>Risks</a:t>
+            </a:r>
+            <a:endParaRPr lang="en-US" dirty="0"/>
+          </a:p>
+        </p:txBody>
+      </p:sp>
+      <p:sp>
+        <p:nvSpPr>
+          <p:cNvPr id="3" name="Content Placeholder 2"/>
+          <p:cNvSpPr>
+            <a:spLocks noGrp="1"/>
+          </p:cNvSpPr>
+          <p:nvPr>
+            <p:ph sz="half" idx="2"/>
+          </p:nvPr>
+        </p:nvSpPr>
+        <p:spPr>
+          <a:xfrm>
+            <a:off x="457200" y="2174875"/>
+            <a:ext cx="2743200" cy="3951288"/>
+          </a:xfrm>
+        </p:spPr>
+        <p:txBody>
+          <a:bodyPr/>
+          <a:lstStyle/>
+          <a:p>
+            <a:r>
+              <a:rPr lang="en-US" dirty="0" smtClean="0"/>
+              <a:t>Python</a:t>
+            </a:r>
+          </a:p>
+          <a:p>
+            <a:r>
+              <a:rPr lang="en-US" dirty="0" smtClean="0"/>
+              <a:t>SUMO</a:t>
+            </a:r>
+          </a:p>
+          <a:p>
+            <a:r>
+              <a:rPr lang="en-US" dirty="0" smtClean="0"/>
+              <a:t>Scope</a:t>
+            </a:r>
+          </a:p>
+          <a:p>
+            <a:r>
+              <a:rPr lang="en-US" dirty="0" smtClean="0"/>
+              <a:t>Time</a:t>
+            </a:r>
+            <a:endParaRPr lang="en-US" dirty="0"/>
+          </a:p>
+        </p:txBody>
+      </p:sp>
+      <p:sp>
+        <p:nvSpPr>
+          <p:cNvPr id="7" name="Text Placeholder 6"/>
+          <p:cNvSpPr>
+            <a:spLocks noGrp="1"/>
+          </p:cNvSpPr>
+          <p:nvPr>
+            <p:ph type="body" sz="quarter" idx="3"/>
+          </p:nvPr>
+        </p:nvSpPr>
+        <p:spPr>
+          <a:xfrm>
+            <a:off x="2825750" y="1535113"/>
+            <a:ext cx="4041775" cy="639762"/>
+          </a:xfrm>
+        </p:spPr>
+        <p:txBody>
+          <a:bodyPr/>
+          <a:lstStyle/>
+          <a:p>
+            <a:r>
+              <a:rPr lang="en-US" dirty="0" smtClean="0"/>
+              <a:t>Spikes</a:t>
+            </a:r>
+            <a:endParaRPr lang="en-US" dirty="0"/>
+          </a:p>
+        </p:txBody>
+      </p:sp>
+      <p:sp>
+        <p:nvSpPr>
+          <p:cNvPr id="8" name="Content Placeholder 7"/>
+          <p:cNvSpPr>
+            <a:spLocks noGrp="1"/>
+          </p:cNvSpPr>
+          <p:nvPr>
+            <p:ph sz="quarter" idx="4"/>
+          </p:nvPr>
+        </p:nvSpPr>
+        <p:spPr>
+          <a:xfrm>
+            <a:off x="2825750" y="2174875"/>
+            <a:ext cx="4041775" cy="3951288"/>
+          </a:xfrm>
+        </p:spPr>
+        <p:txBody>
+          <a:bodyPr/>
+          <a:lstStyle/>
+          <a:p>
+            <a:r>
+              <a:rPr lang="en-US" sz="2000" dirty="0"/>
+              <a:t>SUMO</a:t>
+            </a:r>
+          </a:p>
+          <a:p>
+            <a:pPr lvl="1"/>
+            <a:r>
+              <a:rPr lang="en-US" dirty="0"/>
+              <a:t>Network Load</a:t>
+            </a:r>
+          </a:p>
+          <a:p>
+            <a:pPr lvl="1"/>
+            <a:r>
+              <a:rPr lang="en-US" dirty="0"/>
+              <a:t>Network Double T</a:t>
+            </a:r>
+          </a:p>
+          <a:p>
+            <a:pPr lvl="1"/>
+            <a:r>
+              <a:rPr lang="en-US" dirty="0"/>
+              <a:t>Read from TRACI</a:t>
+            </a:r>
+          </a:p>
+          <a:p>
+            <a:pPr lvl="1"/>
+            <a:r>
+              <a:rPr lang="en-US" dirty="0"/>
+              <a:t>Send to TRACI</a:t>
+            </a:r>
+          </a:p>
+          <a:p>
+            <a:pPr lvl="1"/>
+            <a:r>
+              <a:rPr lang="en-US" dirty="0"/>
+              <a:t>Network Metrics</a:t>
+            </a:r>
+          </a:p>
+          <a:p>
+            <a:pPr lvl="1"/>
+            <a:r>
+              <a:rPr lang="en-US" dirty="0"/>
+              <a:t>Read Sensors</a:t>
+            </a:r>
+          </a:p>
+          <a:p>
+            <a:pPr lvl="1"/>
+            <a:r>
+              <a:rPr lang="en-US" dirty="0"/>
+              <a:t>Add Sensors</a:t>
+            </a:r>
+          </a:p>
+          <a:p>
+            <a:pPr marL="0" indent="0">
+              <a:buNone/>
+            </a:pPr>
+            <a:endParaRPr lang="en-US" dirty="0"/>
+          </a:p>
+        </p:txBody>
+      </p:sp>
+    </p:spTree>
+    <p:extLst>
+      <p:ext uri="{BB962C8B-B14F-4D97-AF65-F5344CB8AC3E}">
+        <p14:creationId xmlns:p14="http://schemas.microsoft.com/office/powerpoint/2010/main" val="810269815"/>
+      </p:ext>
+    </p:extLst>
+  </p:cSld>
+  <p:clrMapOvr>
+    <a:masterClrMapping/>
+  </p:clrMapOvr>
+  <p:timing>
+    <p:tnLst>
+      <p:par>
+        <p:cTn id="1" dur="indefinite" restart="never" nodeType="tmRoot"/>
+      </p:par>
+    </p:tnLst>
+  </p:timing>
+</p:sld>
+</file>
+
+<file path=ppt/slides/slide11.xml><?xml version="1.0" encoding="utf-8"?>
 <p:sld xmlns:a="http://schemas.openxmlformats.org/drawingml/2006/main" xmlns:r="http://schemas.openxmlformats.org/officeDocument/2006/relationships" xmlns:p="http://schemas.openxmlformats.org/presentationml/2006/main">
   <p:cSld>
     <p:spTree>
@@ -4488,78 +4709,6 @@
 </p:sld>
 </file>
 
-<file path=ppt/slides/slide11.xml><?xml version="1.0" encoding="utf-8"?>
-<p:sld xmlns:a="http://schemas.openxmlformats.org/drawingml/2006/main" xmlns:r="http://schemas.openxmlformats.org/officeDocument/2006/relationships" xmlns:p="http://schemas.openxmlformats.org/presentationml/2006/main">
-  <p:cSld>
-    <p:spTree>
-      <p:nvGrpSpPr>
-        <p:cNvPr id="1" name=""/>
-        <p:cNvGrpSpPr/>
-        <p:nvPr/>
-      </p:nvGrpSpPr>
-      <p:grpSpPr>
-        <a:xfrm>
-          <a:off x="0" y="0"/>
-          <a:ext cx="0" cy="0"/>
-          <a:chOff x="0" y="0"/>
-          <a:chExt cx="0" cy="0"/>
-        </a:xfrm>
-      </p:grpSpPr>
-      <p:sp>
-        <p:nvSpPr>
-          <p:cNvPr id="2" name="Title 1"/>
-          <p:cNvSpPr>
-            <a:spLocks noGrp="1"/>
-          </p:cNvSpPr>
-          <p:nvPr>
-            <p:ph type="title"/>
-          </p:nvPr>
-        </p:nvSpPr>
-        <p:spPr/>
-        <p:txBody>
-          <a:bodyPr/>
-          <a:lstStyle/>
-          <a:p>
-            <a:r>
-              <a:rPr lang="en-US" dirty="0" smtClean="0"/>
-              <a:t>Executable Architecture Prototype</a:t>
-            </a:r>
-            <a:endParaRPr lang="en-US" dirty="0"/>
-          </a:p>
-        </p:txBody>
-      </p:sp>
-      <p:sp>
-        <p:nvSpPr>
-          <p:cNvPr id="3" name="Content Placeholder 2"/>
-          <p:cNvSpPr>
-            <a:spLocks noGrp="1"/>
-          </p:cNvSpPr>
-          <p:nvPr>
-            <p:ph idx="1"/>
-          </p:nvPr>
-        </p:nvSpPr>
-        <p:spPr/>
-        <p:txBody>
-          <a:bodyPr/>
-          <a:lstStyle/>
-          <a:p>
-            <a:endParaRPr lang="en-US"/>
-          </a:p>
-        </p:txBody>
-      </p:sp>
-    </p:spTree>
-    <p:extLst>
-      <p:ext uri="{BB962C8B-B14F-4D97-AF65-F5344CB8AC3E}">
-        <p14:creationId xmlns:p14="http://schemas.microsoft.com/office/powerpoint/2010/main" val="2503450557"/>
-      </p:ext>
-    </p:extLst>
-  </p:cSld>
-  <p:clrMapOvr>
-    <a:masterClrMapping/>
-  </p:clrMapOvr>
-</p:sld>
-</file>
-
 <file path=ppt/slides/slide12.xml><?xml version="1.0" encoding="utf-8"?>
 <p:sld xmlns:a="http://schemas.openxmlformats.org/drawingml/2006/main" xmlns:r="http://schemas.openxmlformats.org/officeDocument/2006/relationships" xmlns:p="http://schemas.openxmlformats.org/presentationml/2006/main">
   <p:cSld>
@@ -4594,15 +4743,7 @@
           <a:p>
             <a:r>
               <a:rPr lang="en-US" dirty="0" smtClean="0"/>
-              <a:t>Phase </a:t>
-            </a:r>
-            <a:r>
-              <a:rPr lang="en-US" dirty="0" smtClean="0"/>
-              <a:t>III </a:t>
-            </a:r>
-            <a:r>
-              <a:rPr lang="en-US" dirty="0" smtClean="0"/>
-              <a:t>Deliverables</a:t>
+              <a:t>Phase III Deliverables</a:t>
             </a:r>
             <a:endParaRPr lang="en-US" dirty="0"/>
           </a:p>
@@ -4628,13 +4769,23 @@
           <a:bodyPr/>
           <a:lstStyle/>
           <a:p>
+            <a:pPr>
+              <a:buFont typeface="Arial" pitchFamily="34" charset="0"/>
+              <a:buChar char="•"/>
+            </a:pPr>
             <a:r>
               <a:rPr lang="en-US" sz="2400" dirty="0" smtClean="0"/>
-              <a:t>Action Items from Phase </a:t>
-            </a:r>
+              <a:t>Track SLOC (graph)</a:t>
+            </a:r>
+          </a:p>
+          <a:p>
+            <a:pPr>
+              <a:buFont typeface="Arial" pitchFamily="34" charset="0"/>
+              <a:buChar char="•"/>
+            </a:pPr>
             <a:r>
               <a:rPr lang="en-US" sz="2400" dirty="0" smtClean="0"/>
-              <a:t>2</a:t>
+              <a:t>Track Rework (graph)</a:t>
             </a:r>
             <a:endParaRPr lang="en-US" sz="2400" dirty="0" smtClean="0"/>
           </a:p>
@@ -4697,7 +4848,7 @@
           <a:p>
             <a:r>
               <a:rPr lang="en-US" dirty="0" smtClean="0"/>
-              <a:t>Project Risks and Spikes</a:t>
+              <a:t>Questions and Comments</a:t>
             </a:r>
             <a:endParaRPr lang="en-US" dirty="0"/>
           </a:p>
@@ -4705,195 +4856,39 @@
       </p:sp>
       <p:sp>
         <p:nvSpPr>
-          <p:cNvPr id="6" name="Text Placeholder 5"/>
-          <p:cNvSpPr>
-            <a:spLocks noGrp="1"/>
-          </p:cNvSpPr>
-          <p:nvPr>
-            <p:ph type="body" idx="1"/>
+          <p:cNvPr id="3" name="Content Placeholder 2"/>
+          <p:cNvSpPr>
+            <a:spLocks noGrp="1"/>
+          </p:cNvSpPr>
+          <p:nvPr>
+            <p:ph idx="1"/>
           </p:nvPr>
         </p:nvSpPr>
         <p:spPr>
           <a:xfrm>
-            <a:off x="457200" y="1535113"/>
-            <a:ext cx="2743200" cy="639762"/>
+            <a:off x="3581400" y="1676400"/>
+            <a:ext cx="1905000" cy="3048000"/>
           </a:xfrm>
         </p:spPr>
         <p:txBody>
           <a:bodyPr/>
           <a:lstStyle/>
-          <a:p>
-            <a:r>
-              <a:rPr lang="en-US" dirty="0" smtClean="0"/>
-              <a:t>Risks</a:t>
-            </a:r>
-            <a:endParaRPr lang="en-US" dirty="0"/>
-          </a:p>
-        </p:txBody>
-      </p:sp>
-      <p:sp>
-        <p:nvSpPr>
-          <p:cNvPr id="3" name="Content Placeholder 2"/>
-          <p:cNvSpPr>
-            <a:spLocks noGrp="1"/>
-          </p:cNvSpPr>
-          <p:nvPr>
-            <p:ph sz="half" idx="2"/>
-          </p:nvPr>
-        </p:nvSpPr>
-        <p:spPr>
-          <a:xfrm>
-            <a:off x="457200" y="2174875"/>
-            <a:ext cx="2743200" cy="3951288"/>
-          </a:xfrm>
-        </p:spPr>
-        <p:txBody>
-          <a:bodyPr/>
-          <a:lstStyle/>
-          <a:p>
-            <a:r>
-              <a:rPr lang="en-US" dirty="0" smtClean="0"/>
-              <a:t>Python</a:t>
-            </a:r>
-            <a:endParaRPr lang="en-US" dirty="0" smtClean="0"/>
-          </a:p>
-          <a:p>
-            <a:r>
-              <a:rPr lang="en-US" dirty="0" smtClean="0"/>
-              <a:t>SUMO</a:t>
-            </a:r>
-            <a:endParaRPr lang="en-US" dirty="0" smtClean="0"/>
-          </a:p>
-          <a:p>
-            <a:r>
-              <a:rPr lang="en-US" dirty="0" smtClean="0"/>
-              <a:t>Scope</a:t>
-            </a:r>
-            <a:endParaRPr lang="en-US" dirty="0" smtClean="0"/>
-          </a:p>
-          <a:p>
-            <a:r>
-              <a:rPr lang="en-US" dirty="0" smtClean="0"/>
-              <a:t>Time</a:t>
-            </a:r>
-            <a:endParaRPr lang="en-US" dirty="0"/>
-          </a:p>
-        </p:txBody>
-      </p:sp>
-      <p:sp>
-        <p:nvSpPr>
-          <p:cNvPr id="7" name="Text Placeholder 6"/>
-          <p:cNvSpPr>
-            <a:spLocks noGrp="1"/>
-          </p:cNvSpPr>
-          <p:nvPr>
-            <p:ph type="body" sz="quarter" idx="3"/>
-          </p:nvPr>
-        </p:nvSpPr>
-        <p:spPr>
-          <a:xfrm>
-            <a:off x="2825750" y="1535113"/>
-            <a:ext cx="4041775" cy="639762"/>
-          </a:xfrm>
-        </p:spPr>
-        <p:txBody>
-          <a:bodyPr/>
-          <a:lstStyle/>
-          <a:p>
-            <a:r>
-              <a:rPr lang="en-US" dirty="0" smtClean="0"/>
-              <a:t>Spikes</a:t>
-            </a:r>
-            <a:endParaRPr lang="en-US" dirty="0"/>
-          </a:p>
-        </p:txBody>
-      </p:sp>
-      <p:sp>
-        <p:nvSpPr>
-          <p:cNvPr id="8" name="Content Placeholder 7"/>
-          <p:cNvSpPr>
-            <a:spLocks noGrp="1"/>
-          </p:cNvSpPr>
-          <p:nvPr>
-            <p:ph sz="quarter" idx="4"/>
-          </p:nvPr>
-        </p:nvSpPr>
-        <p:spPr>
-          <a:xfrm>
-            <a:off x="2825750" y="2174875"/>
-            <a:ext cx="4041775" cy="3951288"/>
-          </a:xfrm>
-        </p:spPr>
-        <p:txBody>
-          <a:bodyPr/>
-          <a:lstStyle/>
-          <a:p>
-            <a:r>
-              <a:rPr lang="en-US" sz="2000" dirty="0"/>
-              <a:t>SUMO</a:t>
-            </a:r>
-          </a:p>
-          <a:p>
-            <a:pPr lvl="1"/>
-            <a:r>
-              <a:rPr lang="en-US" dirty="0"/>
-              <a:t>Network Load</a:t>
-            </a:r>
-          </a:p>
-          <a:p>
-            <a:pPr lvl="1"/>
-            <a:r>
-              <a:rPr lang="en-US" dirty="0"/>
-              <a:t>Network Double T</a:t>
-            </a:r>
-          </a:p>
-          <a:p>
-            <a:pPr lvl="1"/>
-            <a:r>
-              <a:rPr lang="en-US" dirty="0"/>
-              <a:t>Read from TRACI</a:t>
-            </a:r>
-          </a:p>
-          <a:p>
-            <a:pPr lvl="1"/>
-            <a:r>
-              <a:rPr lang="en-US" dirty="0"/>
-              <a:t>Send to TRACI</a:t>
-            </a:r>
-          </a:p>
-          <a:p>
-            <a:pPr lvl="1"/>
-            <a:r>
-              <a:rPr lang="en-US" dirty="0"/>
-              <a:t>Network Metrics</a:t>
-            </a:r>
-          </a:p>
-          <a:p>
-            <a:pPr lvl="1"/>
-            <a:r>
-              <a:rPr lang="en-US" dirty="0"/>
-              <a:t>Read Sensors</a:t>
-            </a:r>
-          </a:p>
-          <a:p>
-            <a:pPr lvl="1"/>
-            <a:r>
-              <a:rPr lang="en-US" dirty="0"/>
-              <a:t>Add Sensors</a:t>
-            </a:r>
-          </a:p>
           <a:p>
             <a:pPr marL="0" indent="0">
               <a:buNone/>
             </a:pPr>
-            <a:endParaRPr lang="en-US" dirty="0"/>
+            <a:r>
+              <a:rPr lang="en-US" sz="20000" dirty="0" smtClean="0"/>
+              <a:t>?</a:t>
+            </a:r>
+            <a:endParaRPr lang="en-US" sz="20000" dirty="0"/>
           </a:p>
         </p:txBody>
       </p:sp>
     </p:spTree>
     <p:extLst>
       <p:ext uri="{BB962C8B-B14F-4D97-AF65-F5344CB8AC3E}">
-        <p14:creationId xmlns:p14="http://schemas.microsoft.com/office/powerpoint/2010/main" val="810269815"/>
+        <p14:creationId xmlns:p14="http://schemas.microsoft.com/office/powerpoint/2010/main" val="3976208202"/>
       </p:ext>
     </p:extLst>
   </p:cSld>
@@ -4937,97 +4932,6 @@
             <p:ph type="title"/>
           </p:nvPr>
         </p:nvSpPr>
-        <p:spPr/>
-        <p:txBody>
-          <a:bodyPr/>
-          <a:lstStyle/>
-          <a:p>
-            <a:r>
-              <a:rPr lang="en-US" dirty="0" smtClean="0"/>
-              <a:t>Questions and Comments</a:t>
-            </a:r>
-            <a:endParaRPr lang="en-US" dirty="0"/>
-          </a:p>
-        </p:txBody>
-      </p:sp>
-      <p:sp>
-        <p:nvSpPr>
-          <p:cNvPr id="3" name="Content Placeholder 2"/>
-          <p:cNvSpPr>
-            <a:spLocks noGrp="1"/>
-          </p:cNvSpPr>
-          <p:nvPr>
-            <p:ph idx="1"/>
-          </p:nvPr>
-        </p:nvSpPr>
-        <p:spPr>
-          <a:xfrm>
-            <a:off x="3581400" y="1676400"/>
-            <a:ext cx="1905000" cy="3048000"/>
-          </a:xfrm>
-        </p:spPr>
-        <p:txBody>
-          <a:bodyPr/>
-          <a:lstStyle/>
-          <a:p>
-            <a:pPr marL="0" indent="0">
-              <a:buNone/>
-            </a:pPr>
-            <a:r>
-              <a:rPr lang="en-US" sz="20000" dirty="0" smtClean="0"/>
-              <a:t>?</a:t>
-            </a:r>
-            <a:endParaRPr lang="en-US" sz="20000" dirty="0"/>
-          </a:p>
-        </p:txBody>
-      </p:sp>
-    </p:spTree>
-    <p:extLst>
-      <p:ext uri="{BB962C8B-B14F-4D97-AF65-F5344CB8AC3E}">
-        <p14:creationId xmlns:p14="http://schemas.microsoft.com/office/powerpoint/2010/main" val="3976208202"/>
-      </p:ext>
-    </p:extLst>
-  </p:cSld>
-  <p:clrMapOvr>
-    <a:masterClrMapping/>
-  </p:clrMapOvr>
-  <p:timing>
-    <p:tnLst>
-      <p:par>
-        <p:cTn id="1" dur="indefinite" restart="never" nodeType="tmRoot"/>
-      </p:par>
-    </p:tnLst>
-  </p:timing>
-</p:sld>
-</file>
-
-<file path=ppt/slides/slide15.xml><?xml version="1.0" encoding="utf-8"?>
-<p:sld xmlns:a="http://schemas.openxmlformats.org/drawingml/2006/main" xmlns:r="http://schemas.openxmlformats.org/officeDocument/2006/relationships" xmlns:p="http://schemas.openxmlformats.org/presentationml/2006/main">
-  <p:cSld>
-    <p:spTree>
-      <p:nvGrpSpPr>
-        <p:cNvPr id="1" name=""/>
-        <p:cNvGrpSpPr/>
-        <p:nvPr/>
-      </p:nvGrpSpPr>
-      <p:grpSpPr>
-        <a:xfrm>
-          <a:off x="0" y="0"/>
-          <a:ext cx="0" cy="0"/>
-          <a:chOff x="0" y="0"/>
-          <a:chExt cx="0" cy="0"/>
-        </a:xfrm>
-      </p:grpSpPr>
-      <p:sp>
-        <p:nvSpPr>
-          <p:cNvPr id="2" name="Title 1"/>
-          <p:cNvSpPr>
-            <a:spLocks noGrp="1"/>
-          </p:cNvSpPr>
-          <p:nvPr>
-            <p:ph type="title"/>
-          </p:nvPr>
-        </p:nvSpPr>
         <p:spPr>
           <a:xfrm>
             <a:off x="457200" y="152400"/>
@@ -5434,7 +5338,7 @@
 </p:sld>
 </file>
 
-<file path=ppt/slides/slide16.xml><?xml version="1.0" encoding="utf-8"?>
+<file path=ppt/slides/slide15.xml><?xml version="1.0" encoding="utf-8"?>
 <p:sld xmlns:a="http://schemas.openxmlformats.org/drawingml/2006/main" xmlns:r="http://schemas.openxmlformats.org/officeDocument/2006/relationships" xmlns:p="http://schemas.openxmlformats.org/presentationml/2006/main">
   <p:cSld>
     <p:spTree>
@@ -5915,7 +5819,12 @@
             <p:ph type="title"/>
           </p:nvPr>
         </p:nvSpPr>
-        <p:spPr/>
+        <p:spPr>
+          <a:xfrm>
+            <a:off x="457200" y="112713"/>
+            <a:ext cx="8229600" cy="1143000"/>
+          </a:xfrm>
+        </p:spPr>
         <p:txBody>
           <a:bodyPr/>
           <a:lstStyle/>
@@ -5938,7 +5847,12 @@
             <p:ph idx="1"/>
           </p:nvPr>
         </p:nvSpPr>
-        <p:spPr/>
+        <p:spPr>
+          <a:xfrm>
+            <a:off x="457200" y="1143000"/>
+            <a:ext cx="8229600" cy="4983163"/>
+          </a:xfrm>
+        </p:spPr>
         <p:txBody>
           <a:bodyPr/>
           <a:lstStyle/>
@@ -5951,19 +5865,38 @@
           <a:p>
             <a:r>
               <a:rPr lang="en-US" dirty="0" smtClean="0"/>
-              <a:t>Track SLOC and provide alternate estimates</a:t>
-            </a:r>
-          </a:p>
-          <a:p>
+              <a:t>Track </a:t>
+            </a:r>
             <a:r>
               <a:rPr lang="en-US" dirty="0" smtClean="0"/>
-              <a:t>Track rework per week (graph)</a:t>
+              <a:t>SLOC (project code)</a:t>
             </a:r>
           </a:p>
           <a:p>
             <a:r>
               <a:rPr lang="en-US" dirty="0" smtClean="0"/>
-              <a:t>System evaluation should include and describe comparison baseline.</a:t>
+              <a:t>Alternate code size estimate</a:t>
+            </a:r>
+          </a:p>
+          <a:p>
+            <a:pPr marL="742950" lvl="2" indent="-342900"/>
+            <a:r>
+              <a:rPr lang="en-US" dirty="0">
+                <a:solidFill>
+                  <a:srgbClr val="FFFF00"/>
+                </a:solidFill>
+              </a:rPr>
+              <a:t>COCOMO 6400, Me ~1500-2000</a:t>
+            </a:r>
+          </a:p>
+          <a:p>
+            <a:r>
+              <a:rPr lang="en-US" dirty="0" smtClean="0"/>
+              <a:t>System </a:t>
+            </a:r>
+            <a:r>
+              <a:rPr lang="en-US" dirty="0" smtClean="0"/>
+              <a:t>evaluation should include and describe comparison baseline.</a:t>
             </a:r>
           </a:p>
           <a:p>
@@ -5975,11 +5908,7 @@
           <a:p>
             <a:r>
               <a:rPr lang="en-US" dirty="0" smtClean="0"/>
-              <a:t>Request Project </a:t>
-            </a:r>
-            <a:r>
-              <a:rPr lang="en-US" smtClean="0"/>
-              <a:t>Server Space</a:t>
+              <a:t>Request Project Server Space</a:t>
             </a:r>
             <a:endParaRPr lang="en-US" dirty="0"/>
           </a:p>
@@ -6025,7 +5954,12 @@
             <p:ph type="title"/>
           </p:nvPr>
         </p:nvSpPr>
-        <p:spPr/>
+        <p:spPr>
+          <a:xfrm>
+            <a:off x="457200" y="84138"/>
+            <a:ext cx="8229600" cy="1143000"/>
+          </a:xfrm>
+        </p:spPr>
         <p:txBody>
           <a:bodyPr/>
           <a:lstStyle/>
@@ -6048,15 +5982,85 @@
             <p:ph idx="1"/>
           </p:nvPr>
         </p:nvSpPr>
-        <p:spPr/>
+        <p:spPr>
+          <a:xfrm>
+            <a:off x="457200" y="1057276"/>
+            <a:ext cx="4800600" cy="914399"/>
+          </a:xfrm>
+        </p:spPr>
         <p:txBody>
           <a:bodyPr/>
           <a:lstStyle/>
           <a:p>
-            <a:endParaRPr lang="en-US"/>
-          </a:p>
-        </p:txBody>
-      </p:sp>
+            <a:r>
+              <a:rPr lang="en-US" sz="2000" dirty="0" smtClean="0"/>
+              <a:t>Critical Use Cases Diagram updated</a:t>
+            </a:r>
+          </a:p>
+          <a:p>
+            <a:r>
+              <a:rPr lang="en-US" sz="2000" dirty="0" smtClean="0"/>
+              <a:t>Single Iteration Diagram updated</a:t>
+            </a:r>
+            <a:endParaRPr lang="en-US" sz="2000" dirty="0"/>
+          </a:p>
+        </p:txBody>
+      </p:sp>
+      <p:pic>
+        <p:nvPicPr>
+          <p:cNvPr id="4" name="Picture 3"/>
+          <p:cNvPicPr/>
+          <p:nvPr/>
+        </p:nvPicPr>
+        <p:blipFill>
+          <a:blip r:embed="rId2"/>
+          <a:stretch>
+            <a:fillRect/>
+          </a:stretch>
+        </p:blipFill>
+        <p:spPr>
+          <a:xfrm>
+            <a:off x="533400" y="1905000"/>
+            <a:ext cx="3962400" cy="4419600"/>
+          </a:xfrm>
+          <a:prstGeom prst="rect">
+            <a:avLst/>
+          </a:prstGeom>
+        </p:spPr>
+      </p:pic>
+      <p:pic>
+        <p:nvPicPr>
+          <p:cNvPr id="5" name="Picture 4" descr="C:\macts\uml\System Use Case Diagram.jpg"/>
+          <p:cNvPicPr/>
+          <p:nvPr/>
+        </p:nvPicPr>
+        <p:blipFill>
+          <a:blip r:embed="rId3">
+            <a:extLst>
+              <a:ext uri="{28A0092B-C50C-407E-A947-70E740481C1C}">
+                <a14:useLocalDpi xmlns:a14="http://schemas.microsoft.com/office/drawing/2010/main" val="0"/>
+              </a:ext>
+            </a:extLst>
+          </a:blip>
+          <a:srcRect/>
+          <a:stretch>
+            <a:fillRect/>
+          </a:stretch>
+        </p:blipFill>
+        <p:spPr bwMode="auto">
+          <a:xfrm>
+            <a:off x="4648200" y="1905000"/>
+            <a:ext cx="4419600" cy="4438650"/>
+          </a:xfrm>
+          <a:prstGeom prst="rect">
+            <a:avLst/>
+          </a:prstGeom>
+          <a:noFill/>
+          <a:ln>
+            <a:noFill/>
+          </a:ln>
+        </p:spPr>
+      </p:pic>
     </p:spTree>
     <p:extLst>
       <p:ext uri="{BB962C8B-B14F-4D97-AF65-F5344CB8AC3E}">
@@ -6125,7 +6129,11 @@
           <a:bodyPr/>
           <a:lstStyle/>
           <a:p>
-            <a:endParaRPr lang="en-US"/>
+            <a:r>
+              <a:rPr lang="en-US" dirty="0" smtClean="0"/>
+              <a:t>Updated with experience based estimate</a:t>
+            </a:r>
+            <a:endParaRPr lang="en-US" dirty="0"/>
           </a:p>
         </p:txBody>
       </p:sp>

</xml_diff>

<commit_message>
work done towards phase II
</commit_message>
<xml_diff>
--- a/portfolio/PresentationElaboration.pptx
+++ b/portfolio/PresentationElaboration.pptx
@@ -13,10 +13,10 @@
     <p:sldId id="283" r:id="rId4"/>
     <p:sldId id="284" r:id="rId5"/>
     <p:sldId id="285" r:id="rId6"/>
-    <p:sldId id="286" r:id="rId7"/>
-    <p:sldId id="287" r:id="rId8"/>
-    <p:sldId id="288" r:id="rId9"/>
-    <p:sldId id="289" r:id="rId10"/>
+    <p:sldId id="290" r:id="rId7"/>
+    <p:sldId id="288" r:id="rId8"/>
+    <p:sldId id="289" r:id="rId9"/>
+    <p:sldId id="287" r:id="rId10"/>
     <p:sldId id="261" r:id="rId11"/>
     <p:sldId id="265" r:id="rId12"/>
     <p:sldId id="271" r:id="rId13"/>
@@ -206,7 +206,7 @@
           <a:p>
             <a:fld id="{89A61C1C-259F-4962-A7D6-71E772769996}" type="datetimeFigureOut">
               <a:rPr lang="en-US" smtClean="0"/>
-              <a:t>2012-03-12</a:t>
+              <a:t>2012-03-14</a:t>
             </a:fld>
             <a:endParaRPr lang="en-US"/>
           </a:p>
@@ -616,20 +616,6 @@
           <a:bodyPr/>
           <a:lstStyle/>
           <a:p>
-            <a:r>
-              <a:rPr lang="en-US" dirty="0" smtClean="0"/>
-              <a:t>Do the Metrics Agent for the Formal Requirements Specification?</a:t>
-            </a:r>
-          </a:p>
-          <a:p>
-            <a:r>
-              <a:rPr lang="en-US" dirty="0" smtClean="0"/>
-              <a:t>I think my documentation</a:t>
-            </a:r>
-            <a:r>
-              <a:rPr lang="en-US" baseline="0" dirty="0" smtClean="0"/>
-              <a:t> was suggesting the safety officer agent.</a:t>
-            </a:r>
             <a:endParaRPr lang="en-US" dirty="0"/>
           </a:p>
         </p:txBody>
@@ -4410,7 +4396,7 @@
         <p:spPr>
           <a:xfrm>
             <a:off x="457200" y="2174875"/>
-            <a:ext cx="2743200" cy="3951288"/>
+            <a:ext cx="3505200" cy="3951288"/>
           </a:xfrm>
         </p:spPr>
         <p:txBody>
@@ -4431,13 +4417,21 @@
           <a:p>
             <a:r>
               <a:rPr lang="en-US" dirty="0" smtClean="0"/>
-              <a:t>Scope</a:t>
-            </a:r>
-          </a:p>
-          <a:p>
+              <a:t>Time/Scope</a:t>
+            </a:r>
+          </a:p>
+          <a:p>
+            <a:pPr lvl="1"/>
             <a:r>
               <a:rPr lang="en-US" dirty="0" smtClean="0"/>
-              <a:t>Time</a:t>
+              <a:t>Collaboration Agents</a:t>
+            </a:r>
+          </a:p>
+          <a:p>
+            <a:pPr lvl="1"/>
+            <a:r>
+              <a:rPr lang="en-US" dirty="0" smtClean="0"/>
+              <a:t>Genetic Agent</a:t>
             </a:r>
             <a:endParaRPr lang="en-US" dirty="0"/>
           </a:p>
@@ -4455,7 +4449,7 @@
         </p:nvSpPr>
         <p:spPr>
           <a:xfrm>
-            <a:off x="2825750" y="1535113"/>
+            <a:off x="4102100" y="1535113"/>
             <a:ext cx="4041775" cy="639762"/>
           </a:xfrm>
         </p:spPr>
@@ -4483,7 +4477,7 @@
         </p:nvSpPr>
         <p:spPr>
           <a:xfrm>
-            <a:off x="2825750" y="2174875"/>
+            <a:off x="4102100" y="2174875"/>
             <a:ext cx="4041775" cy="3951288"/>
           </a:xfrm>
         </p:spPr>
@@ -4627,7 +4621,7 @@
       </p:sp>
       <p:pic>
         <p:nvPicPr>
-          <p:cNvPr id="10242" name="Picture 2"/>
+          <p:cNvPr id="2050" name="Picture 2"/>
           <p:cNvPicPr>
             <a:picLocks noChangeAspect="1" noChangeArrowheads="1"/>
           </p:cNvPicPr>
@@ -4648,8 +4642,8 @@
         </p:blipFill>
         <p:spPr bwMode="auto">
           <a:xfrm>
-            <a:off x="533400" y="1728788"/>
-            <a:ext cx="5420129" cy="4367212"/>
+            <a:off x="838200" y="1295400"/>
+            <a:ext cx="6257925" cy="4705350"/>
           </a:xfrm>
           <a:prstGeom prst="rect">
             <a:avLst/>
@@ -4736,7 +4730,12 @@
             <p:ph type="title"/>
           </p:nvPr>
         </p:nvSpPr>
-        <p:spPr/>
+        <p:spPr>
+          <a:xfrm>
+            <a:off x="457200" y="67244"/>
+            <a:ext cx="8229600" cy="923356"/>
+          </a:xfrm>
+        </p:spPr>
         <p:txBody>
           <a:bodyPr/>
           <a:lstStyle/>
@@ -4761,8 +4760,8 @@
         </p:nvSpPr>
         <p:spPr>
           <a:xfrm>
-            <a:off x="457200" y="1295400"/>
-            <a:ext cx="8229600" cy="5029200"/>
+            <a:off x="1550732" y="899466"/>
+            <a:ext cx="6705600" cy="5653734"/>
           </a:xfrm>
         </p:spPr>
         <p:txBody>
@@ -4774,8 +4773,8 @@
               <a:buChar char="•"/>
             </a:pPr>
             <a:r>
-              <a:rPr lang="en-US" sz="2400" dirty="0" smtClean="0"/>
-              <a:t>Track SLOC (graph)</a:t>
+              <a:rPr lang="en-US" sz="2200" dirty="0" smtClean="0"/>
+              <a:t>Action Items from Phase II</a:t>
             </a:r>
           </a:p>
           <a:p>
@@ -4784,13 +4783,140 @@
               <a:buChar char="•"/>
             </a:pPr>
             <a:r>
-              <a:rPr lang="en-US" sz="2400" dirty="0" smtClean="0"/>
-              <a:t>Track Rework (graph)</a:t>
-            </a:r>
-            <a:endParaRPr lang="en-US" sz="2400" dirty="0" smtClean="0"/>
-          </a:p>
-          <a:p>
-            <a:endParaRPr lang="en-US" sz="2400" dirty="0"/>
+              <a:rPr lang="en-US" sz="2200" dirty="0" smtClean="0"/>
+              <a:t>Graph of project SLOC progress</a:t>
+            </a:r>
+            <a:endParaRPr lang="en-US" sz="2200" dirty="0" smtClean="0"/>
+          </a:p>
+          <a:p>
+            <a:pPr>
+              <a:buFont typeface="Arial" pitchFamily="34" charset="0"/>
+              <a:buChar char="•"/>
+            </a:pPr>
+            <a:r>
+              <a:rPr lang="en-US" sz="2200" dirty="0" smtClean="0"/>
+              <a:t>Graph of project Rework effort</a:t>
+            </a:r>
+          </a:p>
+          <a:p>
+            <a:pPr>
+              <a:buFont typeface="Arial" pitchFamily="34" charset="0"/>
+              <a:buChar char="•"/>
+            </a:pPr>
+            <a:r>
+              <a:rPr lang="en-US" sz="2200" dirty="0" smtClean="0"/>
+              <a:t>Project materials on </a:t>
+            </a:r>
+            <a:r>
+              <a:rPr lang="en-US" sz="2200" dirty="0" err="1" smtClean="0"/>
+              <a:t>gForge</a:t>
+            </a:r>
+            <a:r>
+              <a:rPr lang="en-US" sz="2200" dirty="0" smtClean="0"/>
+              <a:t> server</a:t>
+            </a:r>
+          </a:p>
+          <a:p>
+            <a:pPr>
+              <a:buFont typeface="Arial" pitchFamily="34" charset="0"/>
+              <a:buChar char="•"/>
+            </a:pPr>
+            <a:r>
+              <a:rPr lang="en-US" sz="2200" dirty="0" smtClean="0"/>
+              <a:t>User Manual</a:t>
+            </a:r>
+          </a:p>
+          <a:p>
+            <a:pPr>
+              <a:buFont typeface="Arial" pitchFamily="34" charset="0"/>
+              <a:buChar char="•"/>
+            </a:pPr>
+            <a:r>
+              <a:rPr lang="en-US" sz="2200" dirty="0" smtClean="0"/>
+              <a:t>Component Design</a:t>
+            </a:r>
+          </a:p>
+          <a:p>
+            <a:pPr>
+              <a:buFont typeface="Arial" pitchFamily="34" charset="0"/>
+              <a:buChar char="•"/>
+            </a:pPr>
+            <a:r>
+              <a:rPr lang="en-US" sz="2200" dirty="0" smtClean="0"/>
+              <a:t>Source Code</a:t>
+            </a:r>
+          </a:p>
+          <a:p>
+            <a:pPr>
+              <a:buFont typeface="Arial" pitchFamily="34" charset="0"/>
+              <a:buChar char="•"/>
+            </a:pPr>
+            <a:r>
+              <a:rPr lang="en-US" sz="2200" dirty="0" smtClean="0"/>
+              <a:t>Assessment Evaluation</a:t>
+            </a:r>
+          </a:p>
+          <a:p>
+            <a:pPr>
+              <a:buFont typeface="Arial" pitchFamily="34" charset="0"/>
+              <a:buChar char="•"/>
+            </a:pPr>
+            <a:r>
+              <a:rPr lang="en-US" sz="2200" dirty="0" smtClean="0"/>
+              <a:t>Project Evaluation</a:t>
+            </a:r>
+          </a:p>
+          <a:p>
+            <a:pPr>
+              <a:buFont typeface="Arial" pitchFamily="34" charset="0"/>
+              <a:buChar char="•"/>
+            </a:pPr>
+            <a:r>
+              <a:rPr lang="en-US" sz="2200" dirty="0" smtClean="0"/>
+              <a:t>References</a:t>
+            </a:r>
+          </a:p>
+          <a:p>
+            <a:pPr>
+              <a:buFont typeface="Arial" pitchFamily="34" charset="0"/>
+              <a:buChar char="•"/>
+            </a:pPr>
+            <a:r>
+              <a:rPr lang="en-US" sz="2200" dirty="0" smtClean="0"/>
+              <a:t>Formal Technical Inspection Letters</a:t>
+            </a:r>
+            <a:endParaRPr lang="en-US" sz="2200" dirty="0"/>
+          </a:p>
+          <a:p>
+            <a:pPr>
+              <a:buFont typeface="Arial" pitchFamily="34" charset="0"/>
+              <a:buChar char="•"/>
+            </a:pPr>
+            <a:r>
+              <a:rPr lang="en-US" sz="2200" dirty="0" smtClean="0"/>
+              <a:t>Phase III Presentation</a:t>
+            </a:r>
+          </a:p>
+          <a:p>
+            <a:pPr>
+              <a:buFont typeface="Arial" pitchFamily="34" charset="0"/>
+              <a:buChar char="•"/>
+            </a:pPr>
+            <a:r>
+              <a:rPr lang="en-US" sz="2200" dirty="0" smtClean="0"/>
+              <a:t>Time Log</a:t>
+            </a:r>
+          </a:p>
+          <a:p>
+            <a:pPr>
+              <a:buFont typeface="Arial" pitchFamily="34" charset="0"/>
+              <a:buChar char="•"/>
+            </a:pPr>
+            <a:r>
+              <a:rPr lang="en-US" sz="2200" dirty="0" smtClean="0"/>
+              <a:t>Risk Log Update</a:t>
+            </a:r>
+            <a:endParaRPr lang="en-US" sz="2200" dirty="0"/>
           </a:p>
         </p:txBody>
       </p:sp>
@@ -5726,19 +5852,11 @@
           <a:p>
             <a:r>
               <a:rPr lang="en-US" sz="2800" dirty="0"/>
-              <a:t>Project Plan 2.0</a:t>
-            </a:r>
-          </a:p>
-          <a:p>
-            <a:r>
-              <a:rPr lang="en-US" sz="2800" dirty="0"/>
-              <a:t>Formal Requirements Specification</a:t>
-            </a:r>
-          </a:p>
-          <a:p>
-            <a:r>
-              <a:rPr lang="en-US" sz="2800" dirty="0"/>
-              <a:t>Architecture Design 1.0</a:t>
+              <a:t>Project Plan </a:t>
+            </a:r>
+            <a:r>
+              <a:rPr lang="en-US" sz="2800" dirty="0" smtClean="0"/>
+              <a:t>2.0</a:t>
             </a:r>
           </a:p>
           <a:p>
@@ -5750,13 +5868,48 @@
           <a:p>
             <a:r>
               <a:rPr lang="en-US" sz="2800" dirty="0"/>
-              <a:t>Formal Technical Inspection Checklist</a:t>
-            </a:r>
-          </a:p>
-          <a:p>
+              <a:t>Formal Technical Inspection </a:t>
+            </a:r>
+            <a:r>
+              <a:rPr lang="en-US" sz="2800" dirty="0" smtClean="0"/>
+              <a:t>Checklist</a:t>
+            </a:r>
+            <a:endParaRPr lang="en-US" sz="2800" dirty="0"/>
+          </a:p>
+          <a:p>
+            <a:r>
+              <a:rPr lang="en-US" sz="2800" dirty="0" smtClean="0"/>
+              <a:t>System Architecture </a:t>
+            </a:r>
             <a:r>
               <a:rPr lang="en-US" sz="2800" dirty="0"/>
-              <a:t>Executable Architecture Prototype</a:t>
+              <a:t>Design </a:t>
+            </a:r>
+            <a:r>
+              <a:rPr lang="en-US" sz="2800" dirty="0" smtClean="0"/>
+              <a:t>1.0</a:t>
+            </a:r>
+          </a:p>
+          <a:p>
+            <a:pPr lvl="1"/>
+            <a:r>
+              <a:rPr lang="en-US" sz="2400" dirty="0"/>
+              <a:t>Formal Requirements </a:t>
+            </a:r>
+            <a:r>
+              <a:rPr lang="en-US" sz="2400" dirty="0" smtClean="0"/>
+              <a:t>Specification</a:t>
+            </a:r>
+            <a:endParaRPr lang="en-US" sz="2400" dirty="0"/>
+          </a:p>
+          <a:p>
+            <a:r>
+              <a:rPr lang="en-US" sz="2800" dirty="0" smtClean="0"/>
+              <a:t>Executable </a:t>
+            </a:r>
+            <a:r>
+              <a:rPr lang="en-US" sz="2800" dirty="0"/>
+              <a:t>Architecture Prototype</a:t>
             </a:r>
           </a:p>
           <a:p>
@@ -5865,11 +6018,7 @@
           <a:p>
             <a:r>
               <a:rPr lang="en-US" dirty="0" smtClean="0"/>
-              <a:t>Track </a:t>
-            </a:r>
-            <a:r>
-              <a:rPr lang="en-US" dirty="0" smtClean="0"/>
-              <a:t>SLOC (project code)</a:t>
+              <a:t>Track SLOC (project code)</a:t>
             </a:r>
           </a:p>
           <a:p>
@@ -5892,11 +6041,7 @@
           <a:p>
             <a:r>
               <a:rPr lang="en-US" dirty="0" smtClean="0"/>
-              <a:t>System </a:t>
-            </a:r>
-            <a:r>
-              <a:rPr lang="en-US" dirty="0" smtClean="0"/>
-              <a:t>evaluation should include and describe comparison baseline.</a:t>
+              <a:t>System evaluation should include and describe comparison baseline.</a:t>
             </a:r>
           </a:p>
           <a:p>
@@ -6131,7 +6276,34 @@
           <a:p>
             <a:r>
               <a:rPr lang="en-US" dirty="0" smtClean="0"/>
-              <a:t>Updated with experience based estimate</a:t>
+              <a:t>Updated with experience based </a:t>
+            </a:r>
+            <a:r>
+              <a:rPr lang="en-US" dirty="0" smtClean="0"/>
+              <a:t>estimate</a:t>
+            </a:r>
+          </a:p>
+          <a:p>
+            <a:pPr lvl="1"/>
+            <a:r>
+              <a:rPr lang="en-US" dirty="0" smtClean="0"/>
+              <a:t>COCOMO 6.4K</a:t>
+            </a:r>
+          </a:p>
+          <a:p>
+            <a:pPr lvl="1"/>
+            <a:r>
+              <a:rPr lang="en-US" dirty="0" smtClean="0"/>
+              <a:t>Experiential ~1.5K-2K</a:t>
+            </a:r>
+          </a:p>
+          <a:p>
+            <a:pPr marL="457200" lvl="1" indent="0">
+              <a:buNone/>
+            </a:pPr>
+            <a:r>
+              <a:rPr lang="en-US" dirty="0" smtClean="0"/>
+              <a:t>(not including comments or test code)</a:t>
             </a:r>
             <a:endParaRPr lang="en-US" dirty="0"/>
           </a:p>
@@ -6167,52 +6339,51 @@
           <a:chExt cx="0" cy="0"/>
         </a:xfrm>
       </p:grpSpPr>
-      <p:sp>
-        <p:nvSpPr>
-          <p:cNvPr id="2" name="Title 1"/>
-          <p:cNvSpPr>
-            <a:spLocks noGrp="1"/>
-          </p:cNvSpPr>
-          <p:nvPr>
-            <p:ph type="title"/>
-          </p:nvPr>
-        </p:nvSpPr>
-        <p:spPr/>
-        <p:txBody>
-          <a:bodyPr/>
-          <a:lstStyle/>
-          <a:p>
-            <a:r>
-              <a:rPr lang="en-US" dirty="0" smtClean="0"/>
-              <a:t>Formal Requirements Specification</a:t>
-            </a:r>
-            <a:endParaRPr lang="en-US" dirty="0"/>
-          </a:p>
-        </p:txBody>
-      </p:sp>
-      <p:sp>
-        <p:nvSpPr>
-          <p:cNvPr id="3" name="Content Placeholder 2"/>
-          <p:cNvSpPr>
-            <a:spLocks noGrp="1"/>
-          </p:cNvSpPr>
-          <p:nvPr>
-            <p:ph idx="1"/>
-          </p:nvPr>
-        </p:nvSpPr>
-        <p:spPr/>
-        <p:txBody>
-          <a:bodyPr/>
-          <a:lstStyle/>
-          <a:p>
-            <a:endParaRPr lang="en-US"/>
-          </a:p>
-        </p:txBody>
-      </p:sp>
+      <p:pic>
+        <p:nvPicPr>
+          <p:cNvPr id="1026" name="Picture 2" descr="C:\macts\website\nehl_elaboration_project_gantt.png"/>
+          <p:cNvPicPr>
+            <a:picLocks noChangeAspect="1" noChangeArrowheads="1"/>
+          </p:cNvPicPr>
+          <p:nvPr/>
+        </p:nvPicPr>
+        <p:blipFill>
+          <a:blip r:embed="rId2">
+            <a:extLst>
+              <a:ext uri="{28A0092B-C50C-407E-A947-70E740481C1C}">
+                <a14:useLocalDpi xmlns:a14="http://schemas.microsoft.com/office/drawing/2010/main" val="0"/>
+              </a:ext>
+            </a:extLst>
+          </a:blip>
+          <a:srcRect/>
+          <a:stretch>
+            <a:fillRect/>
+          </a:stretch>
+        </p:blipFill>
+        <p:spPr bwMode="auto">
+          <a:xfrm>
+            <a:off x="1198758" y="68396"/>
+            <a:ext cx="7107041" cy="6766399"/>
+          </a:xfrm>
+          <a:prstGeom prst="rect">
+            <a:avLst/>
+          </a:prstGeom>
+          <a:noFill/>
+          <a:extLst>
+            <a:ext uri="{909E8E84-426E-40DD-AFC4-6F175D3DCCD1}">
+              <a14:hiddenFill xmlns:a14="http://schemas.microsoft.com/office/drawing/2010/main">
+                <a:solidFill>
+                  <a:srgbClr val="FFFFFF"/>
+                </a:solidFill>
+              </a14:hiddenFill>
+            </a:ext>
+          </a:extLst>
+        </p:spPr>
+      </p:pic>
     </p:spTree>
     <p:extLst>
       <p:ext uri="{BB962C8B-B14F-4D97-AF65-F5344CB8AC3E}">
-        <p14:creationId xmlns:p14="http://schemas.microsoft.com/office/powerpoint/2010/main" val="1939995431"/>
+        <p14:creationId xmlns:p14="http://schemas.microsoft.com/office/powerpoint/2010/main" val="1011742487"/>
       </p:ext>
     </p:extLst>
   </p:cSld>
@@ -6256,7 +6427,7 @@
           <a:p>
             <a:r>
               <a:rPr lang="en-US" dirty="0" smtClean="0"/>
-              <a:t>Architecture Design 1.0</a:t>
+              <a:t>Test Plan</a:t>
             </a:r>
             <a:endParaRPr lang="en-US" dirty="0"/>
           </a:p>
@@ -6277,14 +6448,30 @@
           <a:bodyPr/>
           <a:lstStyle/>
           <a:p>
-            <a:endParaRPr lang="en-US"/>
+            <a:r>
+              <a:rPr lang="en-US" dirty="0" smtClean="0"/>
+              <a:t>Inspections</a:t>
+            </a:r>
+          </a:p>
+          <a:p>
+            <a:r>
+              <a:rPr lang="en-US" dirty="0" smtClean="0"/>
+              <a:t>Feature / Requirement Testing</a:t>
+            </a:r>
+          </a:p>
+          <a:p>
+            <a:r>
+              <a:rPr lang="en-US" dirty="0" smtClean="0"/>
+              <a:t>Scenario Comparisons</a:t>
+            </a:r>
+            <a:endParaRPr lang="en-US" dirty="0"/>
           </a:p>
         </p:txBody>
       </p:sp>
     </p:spTree>
     <p:extLst>
       <p:ext uri="{BB962C8B-B14F-4D97-AF65-F5344CB8AC3E}">
-        <p14:creationId xmlns:p14="http://schemas.microsoft.com/office/powerpoint/2010/main" val="1119126702"/>
+        <p14:creationId xmlns:p14="http://schemas.microsoft.com/office/powerpoint/2010/main" val="3865937728"/>
       </p:ext>
     </p:extLst>
   </p:cSld>
@@ -6328,7 +6515,7 @@
           <a:p>
             <a:r>
               <a:rPr lang="en-US" dirty="0" smtClean="0"/>
-              <a:t>Test Plan</a:t>
+              <a:t>Formal Technical Inspection Checklist</a:t>
             </a:r>
             <a:endParaRPr lang="en-US" dirty="0"/>
           </a:p>
@@ -6349,14 +6536,75 @@
           <a:bodyPr/>
           <a:lstStyle/>
           <a:p>
-            <a:endParaRPr lang="en-US"/>
+            <a:r>
+              <a:rPr lang="en-US" dirty="0" smtClean="0"/>
+              <a:t>System Architecture Document</a:t>
+            </a:r>
+          </a:p>
+          <a:p>
+            <a:pPr lvl="1"/>
+            <a:r>
+              <a:rPr lang="en-US" dirty="0" smtClean="0"/>
+              <a:t>Diagrams</a:t>
+            </a:r>
+          </a:p>
+          <a:p>
+            <a:pPr lvl="1"/>
+            <a:r>
+              <a:rPr lang="en-US" dirty="0" smtClean="0"/>
+              <a:t>Interactions</a:t>
+            </a:r>
+          </a:p>
+          <a:p>
+            <a:pPr lvl="1"/>
+            <a:r>
+              <a:rPr lang="en-US" dirty="0" smtClean="0"/>
+              <a:t>Clarity and Consistency</a:t>
+            </a:r>
+          </a:p>
+          <a:p>
+            <a:pPr lvl="1"/>
+            <a:r>
+              <a:rPr lang="en-US" dirty="0" smtClean="0"/>
+              <a:t>USE/OCL</a:t>
+            </a:r>
+            <a:endParaRPr lang="en-US" dirty="0"/>
+          </a:p>
+          <a:p>
+            <a:r>
+              <a:rPr lang="en-US" dirty="0" smtClean="0"/>
+              <a:t>Inspectors</a:t>
+            </a:r>
+          </a:p>
+          <a:p>
+            <a:pPr lvl="1"/>
+            <a:r>
+              <a:rPr lang="en-US" dirty="0" smtClean="0"/>
+              <a:t>Denise Case</a:t>
+            </a:r>
+          </a:p>
+          <a:p>
+            <a:pPr lvl="1"/>
+            <a:r>
+              <a:rPr lang="en-US" dirty="0" err="1" smtClean="0"/>
+              <a:t>Sindhu</a:t>
+            </a:r>
+            <a:r>
+              <a:rPr lang="en-US" dirty="0" smtClean="0"/>
+              <a:t> </a:t>
+            </a:r>
+            <a:r>
+              <a:rPr lang="en-US" dirty="0" err="1" smtClean="0"/>
+              <a:t>Thotakura</a:t>
+            </a:r>
+            <a:endParaRPr lang="en-US" dirty="0" smtClean="0"/>
           </a:p>
         </p:txBody>
       </p:sp>
     </p:spTree>
     <p:extLst>
       <p:ext uri="{BB962C8B-B14F-4D97-AF65-F5344CB8AC3E}">
-        <p14:creationId xmlns:p14="http://schemas.microsoft.com/office/powerpoint/2010/main" val="3865937728"/>
+        <p14:creationId xmlns:p14="http://schemas.microsoft.com/office/powerpoint/2010/main" val="1641669722"/>
       </p:ext>
     </p:extLst>
   </p:cSld>
@@ -6400,7 +6648,11 @@
           <a:p>
             <a:r>
               <a:rPr lang="en-US" dirty="0" smtClean="0"/>
-              <a:t>Formal Technical Inspection Checklist</a:t>
+              <a:t>System Architecture </a:t>
+            </a:r>
+            <a:r>
+              <a:rPr lang="en-US" dirty="0" smtClean="0"/>
+              <a:t>Design 1.0</a:t>
             </a:r>
             <a:endParaRPr lang="en-US" dirty="0"/>
           </a:p>
@@ -6416,19 +6668,54 @@
             <p:ph idx="1"/>
           </p:nvPr>
         </p:nvSpPr>
-        <p:spPr/>
+        <p:spPr>
+          <a:xfrm>
+            <a:off x="457200" y="1600201"/>
+            <a:ext cx="8229600" cy="1219200"/>
+          </a:xfrm>
+        </p:spPr>
         <p:txBody>
           <a:bodyPr/>
           <a:lstStyle/>
           <a:p>
-            <a:endParaRPr lang="en-US"/>
-          </a:p>
-        </p:txBody>
-      </p:sp>
+            <a:r>
+              <a:rPr lang="en-US" dirty="0" smtClean="0"/>
+              <a:t>Includes </a:t>
+            </a:r>
+            <a:r>
+              <a:rPr lang="en-US" dirty="0"/>
+              <a:t>Formal Requirements Specification</a:t>
+            </a:r>
+            <a:endParaRPr lang="en-US" dirty="0"/>
+          </a:p>
+        </p:txBody>
+      </p:sp>
+      <p:pic>
+        <p:nvPicPr>
+          <p:cNvPr id="4" name="Picture 3"/>
+          <p:cNvPicPr/>
+          <p:nvPr/>
+        </p:nvPicPr>
+        <p:blipFill>
+          <a:blip r:embed="rId2"/>
+          <a:stretch>
+            <a:fillRect/>
+          </a:stretch>
+        </p:blipFill>
+        <p:spPr>
+          <a:xfrm>
+            <a:off x="533400" y="2971800"/>
+            <a:ext cx="8229600" cy="1667510"/>
+          </a:xfrm>
+          <a:prstGeom prst="rect">
+            <a:avLst/>
+          </a:prstGeom>
+        </p:spPr>
+      </p:pic>
     </p:spTree>
     <p:extLst>
       <p:ext uri="{BB962C8B-B14F-4D97-AF65-F5344CB8AC3E}">
-        <p14:creationId xmlns:p14="http://schemas.microsoft.com/office/powerpoint/2010/main" val="1641669722"/>
+        <p14:creationId xmlns:p14="http://schemas.microsoft.com/office/powerpoint/2010/main" val="1119126702"/>
       </p:ext>
     </p:extLst>
   </p:cSld>

</xml_diff>